<commit_message>
Updated Pyramid for the fron page
</commit_message>
<xml_diff>
--- a/images/project_components.pptx
+++ b/images/project_components.pptx
@@ -5,13 +5,18 @@
     <p:sldMasterId id="2147483648" r:id="rId1"/>
   </p:sldMasterIdLst>
   <p:notesMasterIdLst>
-    <p:notesMasterId r:id="rId6"/>
+    <p:notesMasterId r:id="rId11"/>
   </p:notesMasterIdLst>
   <p:sldIdLst>
-    <p:sldId id="268" r:id="rId2"/>
-    <p:sldId id="269" r:id="rId3"/>
-    <p:sldId id="267" r:id="rId4"/>
-    <p:sldId id="266" r:id="rId5"/>
+    <p:sldId id="270" r:id="rId2"/>
+    <p:sldId id="268" r:id="rId3"/>
+    <p:sldId id="271" r:id="rId4"/>
+    <p:sldId id="272" r:id="rId5"/>
+    <p:sldId id="273" r:id="rId6"/>
+    <p:sldId id="269" r:id="rId7"/>
+    <p:sldId id="274" r:id="rId8"/>
+    <p:sldId id="267" r:id="rId9"/>
+    <p:sldId id="266" r:id="rId10"/>
   </p:sldIdLst>
   <p:sldSz cx="9144000" cy="6858000" type="screen4x3"/>
   <p:notesSz cx="6858000" cy="9144000"/>
@@ -195,7 +200,7 @@
           <a:p>
             <a:fld id="{73020D30-0971-514D-9484-BE983D74A9F8}" type="datetimeFigureOut">
               <a:rPr lang="en-US" smtClean="0"/>
-              <a:t>4/13/18</a:t>
+              <a:t>4/16/18</a:t>
             </a:fld>
             <a:endParaRPr lang="en-US"/>
           </a:p>
@@ -644,7 +649,7 @@
           <a:p>
             <a:fld id="{E1CA787B-5697-EC42-B86D-2F35715292B2}" type="datetimeFigureOut">
               <a:rPr lang="en-US" smtClean="0"/>
-              <a:t>4/13/18</a:t>
+              <a:t>4/16/18</a:t>
             </a:fld>
             <a:endParaRPr lang="en-US"/>
           </a:p>
@@ -814,7 +819,7 @@
           <a:p>
             <a:fld id="{E1CA787B-5697-EC42-B86D-2F35715292B2}" type="datetimeFigureOut">
               <a:rPr lang="en-US" smtClean="0"/>
-              <a:t>4/13/18</a:t>
+              <a:t>4/16/18</a:t>
             </a:fld>
             <a:endParaRPr lang="en-US"/>
           </a:p>
@@ -994,7 +999,7 @@
           <a:p>
             <a:fld id="{E1CA787B-5697-EC42-B86D-2F35715292B2}" type="datetimeFigureOut">
               <a:rPr lang="en-US" smtClean="0"/>
-              <a:t>4/13/18</a:t>
+              <a:t>4/16/18</a:t>
             </a:fld>
             <a:endParaRPr lang="en-US"/>
           </a:p>
@@ -1164,7 +1169,7 @@
           <a:p>
             <a:fld id="{E1CA787B-5697-EC42-B86D-2F35715292B2}" type="datetimeFigureOut">
               <a:rPr lang="en-US" smtClean="0"/>
-              <a:t>4/13/18</a:t>
+              <a:t>4/16/18</a:t>
             </a:fld>
             <a:endParaRPr lang="en-US"/>
           </a:p>
@@ -1410,7 +1415,7 @@
           <a:p>
             <a:fld id="{E1CA787B-5697-EC42-B86D-2F35715292B2}" type="datetimeFigureOut">
               <a:rPr lang="en-US" smtClean="0"/>
-              <a:t>4/13/18</a:t>
+              <a:t>4/16/18</a:t>
             </a:fld>
             <a:endParaRPr lang="en-US"/>
           </a:p>
@@ -1698,7 +1703,7 @@
           <a:p>
             <a:fld id="{E1CA787B-5697-EC42-B86D-2F35715292B2}" type="datetimeFigureOut">
               <a:rPr lang="en-US" smtClean="0"/>
-              <a:t>4/13/18</a:t>
+              <a:t>4/16/18</a:t>
             </a:fld>
             <a:endParaRPr lang="en-US"/>
           </a:p>
@@ -2120,7 +2125,7 @@
           <a:p>
             <a:fld id="{E1CA787B-5697-EC42-B86D-2F35715292B2}" type="datetimeFigureOut">
               <a:rPr lang="en-US" smtClean="0"/>
-              <a:t>4/13/18</a:t>
+              <a:t>4/16/18</a:t>
             </a:fld>
             <a:endParaRPr lang="en-US"/>
           </a:p>
@@ -2238,7 +2243,7 @@
           <a:p>
             <a:fld id="{E1CA787B-5697-EC42-B86D-2F35715292B2}" type="datetimeFigureOut">
               <a:rPr lang="en-US" smtClean="0"/>
-              <a:t>4/13/18</a:t>
+              <a:t>4/16/18</a:t>
             </a:fld>
             <a:endParaRPr lang="en-US"/>
           </a:p>
@@ -2333,7 +2338,7 @@
           <a:p>
             <a:fld id="{E1CA787B-5697-EC42-B86D-2F35715292B2}" type="datetimeFigureOut">
               <a:rPr lang="en-US" smtClean="0"/>
-              <a:t>4/13/18</a:t>
+              <a:t>4/16/18</a:t>
             </a:fld>
             <a:endParaRPr lang="en-US"/>
           </a:p>
@@ -2610,7 +2615,7 @@
           <a:p>
             <a:fld id="{E1CA787B-5697-EC42-B86D-2F35715292B2}" type="datetimeFigureOut">
               <a:rPr lang="en-US" smtClean="0"/>
-              <a:t>4/13/18</a:t>
+              <a:t>4/16/18</a:t>
             </a:fld>
             <a:endParaRPr lang="en-US"/>
           </a:p>
@@ -2863,7 +2868,7 @@
           <a:p>
             <a:fld id="{E1CA787B-5697-EC42-B86D-2F35715292B2}" type="datetimeFigureOut">
               <a:rPr lang="en-US" smtClean="0"/>
-              <a:t>4/13/18</a:t>
+              <a:t>4/16/18</a:t>
             </a:fld>
             <a:endParaRPr lang="en-US"/>
           </a:p>
@@ -3076,7 +3081,7 @@
           <a:p>
             <a:fld id="{E1CA787B-5697-EC42-B86D-2F35715292B2}" type="datetimeFigureOut">
               <a:rPr lang="en-US" smtClean="0"/>
-              <a:t>4/13/18</a:t>
+              <a:t>4/16/18</a:t>
             </a:fld>
             <a:endParaRPr lang="en-US"/>
           </a:p>
@@ -3435,6 +3440,626 @@
 </file>
 
 <file path=ppt/slides/slide1.xml><?xml version="1.0" encoding="utf-8"?>
+<p:sld xmlns:a="http://schemas.openxmlformats.org/drawingml/2006/main" xmlns:r="http://schemas.openxmlformats.org/officeDocument/2006/relationships" xmlns:p="http://schemas.openxmlformats.org/presentationml/2006/main">
+  <p:cSld>
+    <p:spTree>
+      <p:nvGrpSpPr>
+        <p:cNvPr id="1" name=""/>
+        <p:cNvGrpSpPr/>
+        <p:nvPr/>
+      </p:nvGrpSpPr>
+      <p:grpSpPr>
+        <a:xfrm>
+          <a:off x="0" y="0"/>
+          <a:ext cx="0" cy="0"/>
+          <a:chOff x="0" y="0"/>
+          <a:chExt cx="0" cy="0"/>
+        </a:xfrm>
+      </p:grpSpPr>
+      <p:sp>
+        <p:nvSpPr>
+          <p:cNvPr id="2" name="Title 1"/>
+          <p:cNvSpPr>
+            <a:spLocks noGrp="1"/>
+          </p:cNvSpPr>
+          <p:nvPr>
+            <p:ph type="title"/>
+          </p:nvPr>
+        </p:nvSpPr>
+        <p:spPr/>
+        <p:txBody>
+          <a:bodyPr>
+            <a:normAutofit fontScale="90000"/>
+          </a:bodyPr>
+          <a:lstStyle/>
+          <a:p>
+            <a:r>
+              <a:rPr lang="en-US" dirty="0" smtClean="0"/>
+              <a:t>Version on the Project Overview Page</a:t>
+            </a:r>
+            <a:endParaRPr lang="en-US" dirty="0"/>
+          </a:p>
+        </p:txBody>
+      </p:sp>
+      <p:sp>
+        <p:nvSpPr>
+          <p:cNvPr id="3" name="Content Placeholder 2"/>
+          <p:cNvSpPr>
+            <a:spLocks noGrp="1"/>
+          </p:cNvSpPr>
+          <p:nvPr>
+            <p:ph idx="1"/>
+          </p:nvPr>
+        </p:nvSpPr>
+        <p:spPr/>
+        <p:txBody>
+          <a:bodyPr/>
+          <a:lstStyle/>
+          <a:p>
+            <a:endParaRPr lang="en-US"/>
+          </a:p>
+        </p:txBody>
+      </p:sp>
+    </p:spTree>
+    <p:extLst>
+      <p:ext uri="{BB962C8B-B14F-4D97-AF65-F5344CB8AC3E}">
+        <p14:creationId xmlns:p14="http://schemas.microsoft.com/office/powerpoint/2010/main" val="266390278"/>
+      </p:ext>
+    </p:extLst>
+  </p:cSld>
+  <p:clrMapOvr>
+    <a:masterClrMapping/>
+  </p:clrMapOvr>
+  <p:timing>
+    <p:tnLst>
+      <p:par>
+        <p:cTn xmlns:p14="http://schemas.microsoft.com/office/powerpoint/2010/main" id="1" dur="indefinite" restart="never" nodeType="tmRoot"/>
+      </p:par>
+    </p:tnLst>
+  </p:timing>
+</p:sld>
+</file>
+
+<file path=ppt/slides/slide2.xml><?xml version="1.0" encoding="utf-8"?>
+<p:sld xmlns:a="http://schemas.openxmlformats.org/drawingml/2006/main" xmlns:r="http://schemas.openxmlformats.org/officeDocument/2006/relationships" xmlns:p="http://schemas.openxmlformats.org/presentationml/2006/main">
+  <p:cSld>
+    <p:spTree>
+      <p:nvGrpSpPr>
+        <p:cNvPr id="1" name=""/>
+        <p:cNvGrpSpPr/>
+        <p:nvPr/>
+      </p:nvGrpSpPr>
+      <p:grpSpPr>
+        <a:xfrm>
+          <a:off x="0" y="0"/>
+          <a:ext cx="0" cy="0"/>
+          <a:chOff x="0" y="0"/>
+          <a:chExt cx="0" cy="0"/>
+        </a:xfrm>
+      </p:grpSpPr>
+      <p:grpSp>
+        <p:nvGrpSpPr>
+          <p:cNvPr id="2" name="Group 1"/>
+          <p:cNvGrpSpPr>
+            <a:grpSpLocks noChangeAspect="1"/>
+          </p:cNvGrpSpPr>
+          <p:nvPr/>
+        </p:nvGrpSpPr>
+        <p:grpSpPr>
+          <a:xfrm>
+            <a:off x="2480634" y="1186361"/>
+            <a:ext cx="3899976" cy="3300326"/>
+            <a:chOff x="1740853" y="1057403"/>
+            <a:chExt cx="5486400" cy="4642827"/>
+          </a:xfrm>
+        </p:grpSpPr>
+        <p:sp>
+          <p:nvSpPr>
+            <p:cNvPr id="18" name="Isosceles Triangle 17"/>
+            <p:cNvSpPr/>
+            <p:nvPr/>
+          </p:nvSpPr>
+          <p:spPr>
+            <a:xfrm flipV="1">
+              <a:off x="3112453" y="3343403"/>
+              <a:ext cx="2743200" cy="2286000"/>
+            </a:xfrm>
+            <a:prstGeom prst="triangle">
+              <a:avLst/>
+            </a:prstGeom>
+            <a:solidFill>
+              <a:schemeClr val="accent6"/>
+            </a:solidFill>
+          </p:spPr>
+          <p:style>
+            <a:lnRef idx="0">
+              <a:schemeClr val="accent1"/>
+            </a:lnRef>
+            <a:fillRef idx="3">
+              <a:schemeClr val="accent1"/>
+            </a:fillRef>
+            <a:effectRef idx="3">
+              <a:schemeClr val="accent1"/>
+            </a:effectRef>
+            <a:fontRef idx="minor">
+              <a:schemeClr val="lt1"/>
+            </a:fontRef>
+          </p:style>
+          <p:txBody>
+            <a:bodyPr rtlCol="0" anchor="b"/>
+            <a:lstStyle/>
+            <a:p>
+              <a:pPr algn="ctr"/>
+              <a:endParaRPr lang="en-US" sz="1400" dirty="0"/>
+            </a:p>
+          </p:txBody>
+        </p:sp>
+        <p:sp>
+          <p:nvSpPr>
+            <p:cNvPr id="17" name="Isosceles Triangle 16"/>
+            <p:cNvSpPr/>
+            <p:nvPr/>
+          </p:nvSpPr>
+          <p:spPr>
+            <a:xfrm>
+              <a:off x="3112453" y="1057403"/>
+              <a:ext cx="2743200" cy="2286000"/>
+            </a:xfrm>
+            <a:prstGeom prst="triangle">
+              <a:avLst/>
+            </a:prstGeom>
+            <a:solidFill>
+              <a:schemeClr val="accent4"/>
+            </a:solidFill>
+          </p:spPr>
+          <p:style>
+            <a:lnRef idx="0">
+              <a:schemeClr val="accent1"/>
+            </a:lnRef>
+            <a:fillRef idx="3">
+              <a:schemeClr val="accent1"/>
+            </a:fillRef>
+            <a:effectRef idx="3">
+              <a:schemeClr val="accent1"/>
+            </a:effectRef>
+            <a:fontRef idx="minor">
+              <a:schemeClr val="lt1"/>
+            </a:fontRef>
+          </p:style>
+          <p:txBody>
+            <a:bodyPr rtlCol="0" anchor="b"/>
+            <a:lstStyle/>
+            <a:p>
+              <a:pPr algn="ctr"/>
+              <a:endParaRPr lang="en-US" sz="1400" dirty="0"/>
+            </a:p>
+          </p:txBody>
+        </p:sp>
+        <p:sp>
+          <p:nvSpPr>
+            <p:cNvPr id="30" name="Isosceles Triangle 29"/>
+            <p:cNvSpPr/>
+            <p:nvPr/>
+          </p:nvSpPr>
+          <p:spPr>
+            <a:xfrm>
+              <a:off x="1740853" y="3343403"/>
+              <a:ext cx="2743200" cy="2286000"/>
+            </a:xfrm>
+            <a:prstGeom prst="triangle">
+              <a:avLst/>
+            </a:prstGeom>
+            <a:solidFill>
+              <a:schemeClr val="accent1"/>
+            </a:solidFill>
+          </p:spPr>
+          <p:style>
+            <a:lnRef idx="0">
+              <a:schemeClr val="accent1"/>
+            </a:lnRef>
+            <a:fillRef idx="3">
+              <a:schemeClr val="accent1"/>
+            </a:fillRef>
+            <a:effectRef idx="3">
+              <a:schemeClr val="accent1"/>
+            </a:effectRef>
+            <a:fontRef idx="minor">
+              <a:schemeClr val="lt1"/>
+            </a:fontRef>
+          </p:style>
+          <p:txBody>
+            <a:bodyPr rtlCol="0" anchor="b"/>
+            <a:lstStyle/>
+            <a:p>
+              <a:pPr algn="ctr"/>
+              <a:endParaRPr lang="en-US" sz="1400" dirty="0"/>
+            </a:p>
+          </p:txBody>
+        </p:sp>
+        <p:sp>
+          <p:nvSpPr>
+            <p:cNvPr id="32" name="Isosceles Triangle 31"/>
+            <p:cNvSpPr/>
+            <p:nvPr/>
+          </p:nvSpPr>
+          <p:spPr>
+            <a:xfrm>
+              <a:off x="4484053" y="3343904"/>
+              <a:ext cx="2743200" cy="2286000"/>
+            </a:xfrm>
+            <a:prstGeom prst="triangle">
+              <a:avLst/>
+            </a:prstGeom>
+            <a:solidFill>
+              <a:schemeClr val="accent3"/>
+            </a:solidFill>
+          </p:spPr>
+          <p:style>
+            <a:lnRef idx="0">
+              <a:schemeClr val="accent3"/>
+            </a:lnRef>
+            <a:fillRef idx="3">
+              <a:schemeClr val="accent3"/>
+            </a:fillRef>
+            <a:effectRef idx="3">
+              <a:schemeClr val="accent3"/>
+            </a:effectRef>
+            <a:fontRef idx="minor">
+              <a:schemeClr val="lt1"/>
+            </a:fontRef>
+          </p:style>
+          <p:txBody>
+            <a:bodyPr rtlCol="0" anchor="b"/>
+            <a:lstStyle/>
+            <a:p>
+              <a:pPr algn="ctr"/>
+              <a:endParaRPr lang="en-US" sz="1400" dirty="0"/>
+            </a:p>
+          </p:txBody>
+        </p:sp>
+        <p:sp>
+          <p:nvSpPr>
+            <p:cNvPr id="19" name="Rectangle 18"/>
+            <p:cNvSpPr/>
+            <p:nvPr/>
+          </p:nvSpPr>
+          <p:spPr>
+            <a:xfrm>
+              <a:off x="3447210" y="2439471"/>
+              <a:ext cx="2086644" cy="369331"/>
+            </a:xfrm>
+            <a:prstGeom prst="rect">
+              <a:avLst/>
+            </a:prstGeom>
+          </p:spPr>
+          <p:txBody>
+            <a:bodyPr wrap="square">
+              <a:spAutoFit/>
+            </a:bodyPr>
+            <a:lstStyle/>
+            <a:p>
+              <a:pPr algn="ctr"/>
+              <a:r>
+                <a:rPr lang="en-US" b="1" dirty="0" smtClean="0">
+                  <a:ln/>
+                  <a:solidFill>
+                    <a:schemeClr val="accent4">
+                      <a:lumMod val="20000"/>
+                      <a:lumOff val="80000"/>
+                    </a:schemeClr>
+                  </a:solidFill>
+                  <a:effectLst>
+                    <a:outerShdw blurRad="50800" dist="38100" dir="2700000" algn="tl" rotWithShape="0">
+                      <a:prstClr val="black">
+                        <a:alpha val="40000"/>
+                      </a:prstClr>
+                    </a:outerShdw>
+                  </a:effectLst>
+                </a:rPr>
+                <a:t>Data API(s)</a:t>
+              </a:r>
+              <a:endParaRPr lang="en-US" b="1" dirty="0">
+                <a:ln/>
+                <a:solidFill>
+                  <a:schemeClr val="accent4">
+                    <a:lumMod val="20000"/>
+                    <a:lumOff val="80000"/>
+                  </a:schemeClr>
+                </a:solidFill>
+                <a:effectLst>
+                  <a:outerShdw blurRad="50800" dist="38100" dir="2700000" algn="tl" rotWithShape="0">
+                    <a:prstClr val="black">
+                      <a:alpha val="40000"/>
+                    </a:prstClr>
+                  </a:outerShdw>
+                </a:effectLst>
+              </a:endParaRPr>
+            </a:p>
+          </p:txBody>
+        </p:sp>
+        <p:sp>
+          <p:nvSpPr>
+            <p:cNvPr id="20" name="Rectangle 19"/>
+            <p:cNvSpPr/>
+            <p:nvPr/>
+          </p:nvSpPr>
+          <p:spPr>
+            <a:xfrm>
+              <a:off x="1985186" y="4692192"/>
+              <a:ext cx="2341262" cy="1008038"/>
+            </a:xfrm>
+            <a:prstGeom prst="rect">
+              <a:avLst/>
+            </a:prstGeom>
+          </p:spPr>
+          <p:txBody>
+            <a:bodyPr wrap="square">
+              <a:spAutoFit/>
+            </a:bodyPr>
+            <a:lstStyle/>
+            <a:p>
+              <a:pPr algn="ctr"/>
+              <a:r>
+                <a:rPr lang="en-US" b="1" dirty="0" smtClean="0">
+                  <a:ln/>
+                  <a:solidFill>
+                    <a:schemeClr val="accent1">
+                      <a:lumMod val="20000"/>
+                      <a:lumOff val="80000"/>
+                    </a:schemeClr>
+                  </a:solidFill>
+                  <a:effectLst>
+                    <a:outerShdw blurRad="50800" dist="38100" dir="2700000" algn="tl" rotWithShape="0">
+                      <a:prstClr val="black">
+                        <a:alpha val="40000"/>
+                      </a:prstClr>
+                    </a:outerShdw>
+                  </a:effectLst>
+                </a:rPr>
+                <a:t>Specification Language</a:t>
+              </a:r>
+              <a:endParaRPr lang="en-US" b="1" dirty="0">
+                <a:ln/>
+                <a:solidFill>
+                  <a:schemeClr val="accent1">
+                    <a:lumMod val="20000"/>
+                    <a:lumOff val="80000"/>
+                  </a:schemeClr>
+                </a:solidFill>
+                <a:effectLst>
+                  <a:outerShdw blurRad="50800" dist="38100" dir="2700000" algn="tl" rotWithShape="0">
+                    <a:prstClr val="black">
+                      <a:alpha val="40000"/>
+                    </a:prstClr>
+                  </a:outerShdw>
+                </a:effectLst>
+              </a:endParaRPr>
+            </a:p>
+          </p:txBody>
+        </p:sp>
+        <p:sp>
+          <p:nvSpPr>
+            <p:cNvPr id="21" name="Rectangle 20"/>
+            <p:cNvSpPr/>
+            <p:nvPr/>
+          </p:nvSpPr>
+          <p:spPr>
+            <a:xfrm>
+              <a:off x="4829676" y="4692192"/>
+              <a:ext cx="2086644" cy="369331"/>
+            </a:xfrm>
+            <a:prstGeom prst="rect">
+              <a:avLst/>
+            </a:prstGeom>
+          </p:spPr>
+          <p:txBody>
+            <a:bodyPr wrap="square">
+              <a:spAutoFit/>
+            </a:bodyPr>
+            <a:lstStyle/>
+            <a:p>
+              <a:pPr algn="ctr"/>
+              <a:r>
+                <a:rPr lang="en-US" b="1" dirty="0" smtClean="0">
+                  <a:ln/>
+                  <a:solidFill>
+                    <a:schemeClr val="accent3">
+                      <a:lumMod val="20000"/>
+                      <a:lumOff val="80000"/>
+                    </a:schemeClr>
+                  </a:solidFill>
+                  <a:effectLst>
+                    <a:outerShdw blurRad="50800" dist="38100" dir="2700000" algn="tl" rotWithShape="0">
+                      <a:prstClr val="black">
+                        <a:alpha val="40000"/>
+                      </a:prstClr>
+                    </a:outerShdw>
+                  </a:effectLst>
+                </a:rPr>
+                <a:t>Data Storage</a:t>
+              </a:r>
+              <a:endParaRPr lang="en-US" b="1" dirty="0">
+                <a:ln/>
+                <a:solidFill>
+                  <a:schemeClr val="accent3">
+                    <a:lumMod val="20000"/>
+                    <a:lumOff val="80000"/>
+                  </a:schemeClr>
+                </a:solidFill>
+                <a:effectLst>
+                  <a:outerShdw blurRad="50800" dist="38100" dir="2700000" algn="tl" rotWithShape="0">
+                    <a:prstClr val="black">
+                      <a:alpha val="40000"/>
+                    </a:prstClr>
+                  </a:outerShdw>
+                </a:effectLst>
+              </a:endParaRPr>
+            </a:p>
+          </p:txBody>
+        </p:sp>
+        <p:sp>
+          <p:nvSpPr>
+            <p:cNvPr id="22" name="Rectangle 21"/>
+            <p:cNvSpPr/>
+            <p:nvPr/>
+          </p:nvSpPr>
+          <p:spPr>
+            <a:xfrm>
+              <a:off x="3187846" y="3408498"/>
+              <a:ext cx="2546390" cy="369331"/>
+            </a:xfrm>
+            <a:prstGeom prst="rect">
+              <a:avLst/>
+            </a:prstGeom>
+          </p:spPr>
+          <p:txBody>
+            <a:bodyPr wrap="square">
+              <a:spAutoFit/>
+            </a:bodyPr>
+            <a:lstStyle/>
+            <a:p>
+              <a:pPr algn="ctr"/>
+              <a:r>
+                <a:rPr lang="en-US" b="1" dirty="0" smtClean="0">
+                  <a:ln/>
+                  <a:solidFill>
+                    <a:schemeClr val="accent6">
+                      <a:lumMod val="20000"/>
+                      <a:lumOff val="80000"/>
+                    </a:schemeClr>
+                  </a:solidFill>
+                  <a:effectLst>
+                    <a:outerShdw blurRad="50800" dist="38100" dir="2700000" algn="tl" rotWithShape="0">
+                      <a:prstClr val="black">
+                        <a:alpha val="40000"/>
+                      </a:prstClr>
+                    </a:outerShdw>
+                  </a:effectLst>
+                </a:rPr>
+                <a:t>Data Standard Schema</a:t>
+              </a:r>
+              <a:endParaRPr lang="en-US" b="1" dirty="0">
+                <a:ln/>
+                <a:solidFill>
+                  <a:schemeClr val="accent6">
+                    <a:lumMod val="20000"/>
+                    <a:lumOff val="80000"/>
+                  </a:schemeClr>
+                </a:solidFill>
+                <a:effectLst>
+                  <a:outerShdw blurRad="50800" dist="38100" dir="2700000" algn="tl" rotWithShape="0">
+                    <a:prstClr val="black">
+                      <a:alpha val="40000"/>
+                    </a:prstClr>
+                  </a:outerShdw>
+                </a:effectLst>
+              </a:endParaRPr>
+            </a:p>
+          </p:txBody>
+        </p:sp>
+      </p:grpSp>
+    </p:spTree>
+    <p:extLst>
+      <p:ext uri="{BB962C8B-B14F-4D97-AF65-F5344CB8AC3E}">
+        <p14:creationId xmlns:p14="http://schemas.microsoft.com/office/powerpoint/2010/main" val="3725189178"/>
+      </p:ext>
+    </p:extLst>
+  </p:cSld>
+  <p:clrMapOvr>
+    <a:masterClrMapping/>
+  </p:clrMapOvr>
+  <p:timing>
+    <p:tnLst>
+      <p:par>
+        <p:cTn xmlns:p14="http://schemas.microsoft.com/office/powerpoint/2010/main" id="1" dur="indefinite" restart="never" nodeType="tmRoot"/>
+      </p:par>
+    </p:tnLst>
+  </p:timing>
+</p:sld>
+</file>
+
+<file path=ppt/slides/slide3.xml><?xml version="1.0" encoding="utf-8"?>
+<p:sld xmlns:a="http://schemas.openxmlformats.org/drawingml/2006/main" xmlns:r="http://schemas.openxmlformats.org/officeDocument/2006/relationships" xmlns:p="http://schemas.openxmlformats.org/presentationml/2006/main">
+  <p:cSld>
+    <p:spTree>
+      <p:nvGrpSpPr>
+        <p:cNvPr id="1" name=""/>
+        <p:cNvGrpSpPr/>
+        <p:nvPr/>
+      </p:nvGrpSpPr>
+      <p:grpSpPr>
+        <a:xfrm>
+          <a:off x="0" y="0"/>
+          <a:ext cx="0" cy="0"/>
+          <a:chOff x="0" y="0"/>
+          <a:chExt cx="0" cy="0"/>
+        </a:xfrm>
+      </p:grpSpPr>
+      <p:sp>
+        <p:nvSpPr>
+          <p:cNvPr id="2" name="Title 1"/>
+          <p:cNvSpPr>
+            <a:spLocks noGrp="1"/>
+          </p:cNvSpPr>
+          <p:nvPr>
+            <p:ph type="title"/>
+          </p:nvPr>
+        </p:nvSpPr>
+        <p:spPr/>
+        <p:txBody>
+          <a:bodyPr>
+            <a:normAutofit/>
+          </a:bodyPr>
+          <a:lstStyle/>
+          <a:p>
+            <a:r>
+              <a:rPr lang="en-US" dirty="0" smtClean="0"/>
+              <a:t>Version on the Front Page</a:t>
+            </a:r>
+            <a:endParaRPr lang="en-US" dirty="0"/>
+          </a:p>
+        </p:txBody>
+      </p:sp>
+      <p:sp>
+        <p:nvSpPr>
+          <p:cNvPr id="3" name="Content Placeholder 2"/>
+          <p:cNvSpPr>
+            <a:spLocks noGrp="1"/>
+          </p:cNvSpPr>
+          <p:nvPr>
+            <p:ph idx="1"/>
+          </p:nvPr>
+        </p:nvSpPr>
+        <p:spPr/>
+        <p:txBody>
+          <a:bodyPr/>
+          <a:lstStyle/>
+          <a:p>
+            <a:endParaRPr lang="en-US"/>
+          </a:p>
+        </p:txBody>
+      </p:sp>
+    </p:spTree>
+    <p:extLst>
+      <p:ext uri="{BB962C8B-B14F-4D97-AF65-F5344CB8AC3E}">
+        <p14:creationId xmlns:p14="http://schemas.microsoft.com/office/powerpoint/2010/main" val="3603976146"/>
+      </p:ext>
+    </p:extLst>
+  </p:cSld>
+  <p:clrMapOvr>
+    <a:masterClrMapping/>
+  </p:clrMapOvr>
+  <p:timing>
+    <p:tnLst>
+      <p:par>
+        <p:cTn xmlns:p14="http://schemas.microsoft.com/office/powerpoint/2010/main" id="1" dur="indefinite" restart="never" nodeType="tmRoot"/>
+      </p:par>
+    </p:tnLst>
+  </p:timing>
+</p:sld>
+</file>
+
+<file path=ppt/slides/slide4.xml><?xml version="1.0" encoding="utf-8"?>
 <p:sld xmlns:a="http://schemas.openxmlformats.org/drawingml/2006/main" xmlns:r="http://schemas.openxmlformats.org/officeDocument/2006/relationships" xmlns:p="http://schemas.openxmlformats.org/presentationml/2006/main">
   <p:cSld>
     <p:spTree>
@@ -4009,7 +4634,7 @@
     </p:spTree>
     <p:extLst>
       <p:ext uri="{BB962C8B-B14F-4D97-AF65-F5344CB8AC3E}">
-        <p14:creationId xmlns:p14="http://schemas.microsoft.com/office/powerpoint/2010/main" val="3725189178"/>
+        <p14:creationId xmlns:p14="http://schemas.microsoft.com/office/powerpoint/2010/main" val="3185297947"/>
       </p:ext>
     </p:extLst>
   </p:cSld>
@@ -4026,7 +4651,81 @@
 </p:sld>
 </file>
 
-<file path=ppt/slides/slide2.xml><?xml version="1.0" encoding="utf-8"?>
+<file path=ppt/slides/slide5.xml><?xml version="1.0" encoding="utf-8"?>
+<p:sld xmlns:a="http://schemas.openxmlformats.org/drawingml/2006/main" xmlns:r="http://schemas.openxmlformats.org/officeDocument/2006/relationships" xmlns:p="http://schemas.openxmlformats.org/presentationml/2006/main">
+  <p:cSld>
+    <p:spTree>
+      <p:nvGrpSpPr>
+        <p:cNvPr id="1" name=""/>
+        <p:cNvGrpSpPr/>
+        <p:nvPr/>
+      </p:nvGrpSpPr>
+      <p:grpSpPr>
+        <a:xfrm>
+          <a:off x="0" y="0"/>
+          <a:ext cx="0" cy="0"/>
+          <a:chOff x="0" y="0"/>
+          <a:chExt cx="0" cy="0"/>
+        </a:xfrm>
+      </p:grpSpPr>
+      <p:sp>
+        <p:nvSpPr>
+          <p:cNvPr id="2" name="Title 1"/>
+          <p:cNvSpPr>
+            <a:spLocks noGrp="1"/>
+          </p:cNvSpPr>
+          <p:nvPr>
+            <p:ph type="title"/>
+          </p:nvPr>
+        </p:nvSpPr>
+        <p:spPr/>
+        <p:txBody>
+          <a:bodyPr>
+            <a:normAutofit/>
+          </a:bodyPr>
+          <a:lstStyle/>
+          <a:p>
+            <a:r>
+              <a:rPr lang="en-US" dirty="0" smtClean="0"/>
+              <a:t>Symbol Markers</a:t>
+            </a:r>
+            <a:endParaRPr lang="en-US" dirty="0"/>
+          </a:p>
+        </p:txBody>
+      </p:sp>
+      <p:sp>
+        <p:nvSpPr>
+          <p:cNvPr id="3" name="Content Placeholder 2"/>
+          <p:cNvSpPr>
+            <a:spLocks noGrp="1"/>
+          </p:cNvSpPr>
+          <p:nvPr>
+            <p:ph idx="1"/>
+          </p:nvPr>
+        </p:nvSpPr>
+        <p:spPr/>
+        <p:txBody>
+          <a:bodyPr/>
+          <a:lstStyle/>
+          <a:p>
+            <a:endParaRPr lang="en-US"/>
+          </a:p>
+        </p:txBody>
+      </p:sp>
+    </p:spTree>
+    <p:extLst>
+      <p:ext uri="{BB962C8B-B14F-4D97-AF65-F5344CB8AC3E}">
+        <p14:creationId xmlns:p14="http://schemas.microsoft.com/office/powerpoint/2010/main" val="3903104340"/>
+      </p:ext>
+    </p:extLst>
+  </p:cSld>
+  <p:clrMapOvr>
+    <a:masterClrMapping/>
+  </p:clrMapOvr>
+</p:sld>
+</file>
+
+<file path=ppt/slides/slide6.xml><?xml version="1.0" encoding="utf-8"?>
 <p:sld xmlns:a="http://schemas.openxmlformats.org/drawingml/2006/main" xmlns:r="http://schemas.openxmlformats.org/officeDocument/2006/relationships" xmlns:p="http://schemas.openxmlformats.org/presentationml/2006/main">
   <p:cSld>
     <p:spTree>
@@ -4053,7 +4752,7 @@
         </p:nvGrpSpPr>
         <p:grpSpPr>
           <a:xfrm>
-            <a:off x="96250" y="142903"/>
+            <a:off x="0" y="142903"/>
             <a:ext cx="2192806" cy="1828800"/>
             <a:chOff x="1740853" y="1057403"/>
             <a:chExt cx="5486400" cy="4572501"/>
@@ -4289,7 +4988,7 @@
         </p:nvGrpSpPr>
         <p:grpSpPr>
           <a:xfrm>
-            <a:off x="507574" y="2280494"/>
+            <a:off x="2289056" y="142703"/>
             <a:ext cx="2192806" cy="1828800"/>
             <a:chOff x="1740853" y="1057403"/>
             <a:chExt cx="5486400" cy="4572501"/>
@@ -4520,30 +5219,278 @@
       </p:grpSp>
       <p:grpSp>
         <p:nvGrpSpPr>
-          <p:cNvPr id="43" name="Group 42"/>
-          <p:cNvGrpSpPr>
-            <a:grpSpLocks noChangeAspect="1"/>
-          </p:cNvGrpSpPr>
+          <p:cNvPr id="2" name="Group 1"/>
+          <p:cNvGrpSpPr/>
           <p:nvPr/>
         </p:nvGrpSpPr>
         <p:grpSpPr>
           <a:xfrm>
-            <a:off x="1055776" y="4461241"/>
-            <a:ext cx="1644605" cy="1828800"/>
-            <a:chOff x="3112453" y="1057403"/>
-            <a:chExt cx="4114800" cy="4572501"/>
+            <a:off x="4619680" y="142103"/>
+            <a:ext cx="2192806" cy="1828800"/>
+            <a:chOff x="507575" y="4461241"/>
+            <a:chExt cx="2192806" cy="1828800"/>
           </a:xfrm>
         </p:grpSpPr>
+        <p:grpSp>
+          <p:nvGrpSpPr>
+            <p:cNvPr id="43" name="Group 42"/>
+            <p:cNvGrpSpPr>
+              <a:grpSpLocks noChangeAspect="1"/>
+            </p:cNvGrpSpPr>
+            <p:nvPr/>
+          </p:nvGrpSpPr>
+          <p:grpSpPr>
+            <a:xfrm>
+              <a:off x="1055776" y="4461241"/>
+              <a:ext cx="1644605" cy="1828800"/>
+              <a:chOff x="3112453" y="1057403"/>
+              <a:chExt cx="4114800" cy="4572501"/>
+            </a:xfrm>
+          </p:grpSpPr>
+          <p:sp>
+            <p:nvSpPr>
+              <p:cNvPr id="45" name="Isosceles Triangle 44"/>
+              <p:cNvSpPr/>
+              <p:nvPr/>
+            </p:nvSpPr>
+            <p:spPr>
+              <a:xfrm>
+                <a:off x="3112453" y="1057403"/>
+                <a:ext cx="2743200" cy="2286000"/>
+              </a:xfrm>
+              <a:prstGeom prst="triangle">
+                <a:avLst/>
+              </a:prstGeom>
+              <a:solidFill>
+                <a:schemeClr val="accent4">
+                  <a:lumMod val="20000"/>
+                  <a:lumOff val="80000"/>
+                </a:schemeClr>
+              </a:solidFill>
+              <a:effectLst/>
+              <a:scene3d>
+                <a:camera prst="orthographicFront">
+                  <a:rot lat="0" lon="0" rev="0"/>
+                </a:camera>
+                <a:lightRig rig="threePt" dir="t">
+                  <a:rot lat="0" lon="0" rev="1200000"/>
+                </a:lightRig>
+              </a:scene3d>
+              <a:sp3d/>
+            </p:spPr>
+            <p:style>
+              <a:lnRef idx="0">
+                <a:schemeClr val="accent1"/>
+              </a:lnRef>
+              <a:fillRef idx="3">
+                <a:schemeClr val="accent1"/>
+              </a:fillRef>
+              <a:effectRef idx="3">
+                <a:schemeClr val="accent1"/>
+              </a:effectRef>
+              <a:fontRef idx="minor">
+                <a:schemeClr val="lt1"/>
+              </a:fontRef>
+            </p:style>
+            <p:txBody>
+              <a:bodyPr rtlCol="0" anchor="b"/>
+              <a:lstStyle/>
+              <a:p>
+                <a:pPr algn="ctr"/>
+                <a:endParaRPr lang="en-US" sz="1400" dirty="0"/>
+              </a:p>
+            </p:txBody>
+          </p:sp>
+          <p:sp>
+            <p:nvSpPr>
+              <p:cNvPr id="47" name="Isosceles Triangle 46"/>
+              <p:cNvSpPr/>
+              <p:nvPr/>
+            </p:nvSpPr>
+            <p:spPr>
+              <a:xfrm>
+                <a:off x="4484053" y="3343904"/>
+                <a:ext cx="2743200" cy="2286000"/>
+              </a:xfrm>
+              <a:prstGeom prst="triangle">
+                <a:avLst/>
+              </a:prstGeom>
+              <a:solidFill>
+                <a:schemeClr val="accent3">
+                  <a:lumMod val="20000"/>
+                  <a:lumOff val="80000"/>
+                </a:schemeClr>
+              </a:solidFill>
+              <a:effectLst/>
+              <a:scene3d>
+                <a:camera prst="orthographicFront">
+                  <a:rot lat="0" lon="0" rev="0"/>
+                </a:camera>
+                <a:lightRig rig="threePt" dir="t">
+                  <a:rot lat="0" lon="0" rev="1200000"/>
+                </a:lightRig>
+              </a:scene3d>
+              <a:sp3d/>
+            </p:spPr>
+            <p:style>
+              <a:lnRef idx="0">
+                <a:schemeClr val="accent3"/>
+              </a:lnRef>
+              <a:fillRef idx="3">
+                <a:schemeClr val="accent3"/>
+              </a:fillRef>
+              <a:effectRef idx="3">
+                <a:schemeClr val="accent3"/>
+              </a:effectRef>
+              <a:fontRef idx="minor">
+                <a:schemeClr val="lt1"/>
+              </a:fontRef>
+            </p:style>
+            <p:txBody>
+              <a:bodyPr rtlCol="0" anchor="b"/>
+              <a:lstStyle/>
+              <a:p>
+                <a:pPr algn="ctr"/>
+                <a:endParaRPr lang="en-US" sz="1400" dirty="0">
+                  <a:solidFill>
+                    <a:schemeClr val="accent3">
+                      <a:lumMod val="40000"/>
+                      <a:lumOff val="60000"/>
+                    </a:schemeClr>
+                  </a:solidFill>
+                </a:endParaRPr>
+              </a:p>
+            </p:txBody>
+          </p:sp>
+        </p:grpSp>
         <p:sp>
           <p:nvSpPr>
-            <p:cNvPr id="45" name="Isosceles Triangle 44"/>
+            <p:cNvPr id="48" name="Isosceles Triangle 47"/>
             <p:cNvSpPr/>
             <p:nvPr/>
           </p:nvSpPr>
           <p:spPr>
             <a:xfrm>
-              <a:off x="3112453" y="1057403"/>
-              <a:ext cx="2743200" cy="2286000"/>
+              <a:off x="507575" y="5375541"/>
+              <a:ext cx="1096403" cy="914300"/>
+            </a:xfrm>
+            <a:prstGeom prst="triangle">
+              <a:avLst/>
+            </a:prstGeom>
+            <a:solidFill>
+              <a:schemeClr val="accent1">
+                <a:lumMod val="20000"/>
+                <a:lumOff val="80000"/>
+              </a:schemeClr>
+            </a:solidFill>
+            <a:effectLst/>
+            <a:scene3d>
+              <a:camera prst="orthographicFront">
+                <a:rot lat="0" lon="0" rev="0"/>
+              </a:camera>
+              <a:lightRig rig="threePt" dir="t">
+                <a:rot lat="0" lon="0" rev="1200000"/>
+              </a:lightRig>
+            </a:scene3d>
+            <a:sp3d/>
+          </p:spPr>
+          <p:style>
+            <a:lnRef idx="0">
+              <a:schemeClr val="accent1"/>
+            </a:lnRef>
+            <a:fillRef idx="3">
+              <a:schemeClr val="accent1"/>
+            </a:fillRef>
+            <a:effectRef idx="3">
+              <a:schemeClr val="accent1"/>
+            </a:effectRef>
+            <a:fontRef idx="minor">
+              <a:schemeClr val="lt1"/>
+            </a:fontRef>
+          </p:style>
+          <p:txBody>
+            <a:bodyPr rtlCol="0" anchor="b"/>
+            <a:lstStyle/>
+            <a:p>
+              <a:pPr algn="ctr"/>
+              <a:endParaRPr lang="en-US" sz="1400" dirty="0"/>
+            </a:p>
+          </p:txBody>
+        </p:sp>
+        <p:sp>
+          <p:nvSpPr>
+            <p:cNvPr id="49" name="Isosceles Triangle 48"/>
+            <p:cNvSpPr/>
+            <p:nvPr/>
+          </p:nvSpPr>
+          <p:spPr>
+            <a:xfrm flipV="1">
+              <a:off x="1055775" y="5375741"/>
+              <a:ext cx="1096403" cy="914300"/>
+            </a:xfrm>
+            <a:prstGeom prst="triangle">
+              <a:avLst/>
+            </a:prstGeom>
+            <a:solidFill>
+              <a:schemeClr val="accent6"/>
+            </a:solidFill>
+            <a:ln>
+              <a:solidFill>
+                <a:schemeClr val="accent6">
+                  <a:lumMod val="50000"/>
+                </a:schemeClr>
+              </a:solidFill>
+            </a:ln>
+            <a:effectLst/>
+          </p:spPr>
+          <p:style>
+            <a:lnRef idx="0">
+              <a:schemeClr val="accent1"/>
+            </a:lnRef>
+            <a:fillRef idx="3">
+              <a:schemeClr val="accent1"/>
+            </a:fillRef>
+            <a:effectRef idx="3">
+              <a:schemeClr val="accent1"/>
+            </a:effectRef>
+            <a:fontRef idx="minor">
+              <a:schemeClr val="lt1"/>
+            </a:fontRef>
+          </p:style>
+          <p:txBody>
+            <a:bodyPr rtlCol="0" anchor="b"/>
+            <a:lstStyle/>
+            <a:p>
+              <a:pPr algn="ctr"/>
+              <a:endParaRPr lang="en-US" sz="1400" dirty="0"/>
+            </a:p>
+          </p:txBody>
+        </p:sp>
+      </p:grpSp>
+      <p:grpSp>
+        <p:nvGrpSpPr>
+          <p:cNvPr id="5" name="Group 4"/>
+          <p:cNvGrpSpPr/>
+          <p:nvPr/>
+        </p:nvGrpSpPr>
+        <p:grpSpPr>
+          <a:xfrm>
+            <a:off x="6855640" y="142303"/>
+            <a:ext cx="2192806" cy="1828800"/>
+            <a:chOff x="3372505" y="4461241"/>
+            <a:chExt cx="2192806" cy="1828800"/>
+          </a:xfrm>
+        </p:grpSpPr>
+        <p:sp>
+          <p:nvSpPr>
+            <p:cNvPr id="51" name="Isosceles Triangle 50"/>
+            <p:cNvSpPr/>
+            <p:nvPr/>
+          </p:nvSpPr>
+          <p:spPr>
+            <a:xfrm>
+              <a:off x="3920706" y="4461241"/>
+              <a:ext cx="1096403" cy="914300"/>
             </a:xfrm>
             <a:prstGeom prst="triangle">
               <a:avLst/>
@@ -4590,20 +5537,20 @@
         </p:sp>
         <p:sp>
           <p:nvSpPr>
-            <p:cNvPr id="47" name="Isosceles Triangle 46"/>
+            <p:cNvPr id="53" name="Isosceles Triangle 52"/>
             <p:cNvSpPr/>
             <p:nvPr/>
           </p:nvSpPr>
           <p:spPr>
             <a:xfrm>
-              <a:off x="4484053" y="3343904"/>
-              <a:ext cx="2743200" cy="2286000"/>
+              <a:off x="3372505" y="5375541"/>
+              <a:ext cx="1096403" cy="914300"/>
             </a:xfrm>
             <a:prstGeom prst="triangle">
               <a:avLst/>
             </a:prstGeom>
             <a:solidFill>
-              <a:schemeClr val="accent3">
+              <a:schemeClr val="accent1">
                 <a:lumMod val="20000"/>
                 <a:lumOff val="80000"/>
               </a:schemeClr>
@@ -4618,6 +5565,112 @@
               </a:lightRig>
             </a:scene3d>
             <a:sp3d/>
+          </p:spPr>
+          <p:style>
+            <a:lnRef idx="0">
+              <a:schemeClr val="accent1"/>
+            </a:lnRef>
+            <a:fillRef idx="3">
+              <a:schemeClr val="accent1"/>
+            </a:fillRef>
+            <a:effectRef idx="3">
+              <a:schemeClr val="accent1"/>
+            </a:effectRef>
+            <a:fontRef idx="minor">
+              <a:schemeClr val="lt1"/>
+            </a:fontRef>
+          </p:style>
+          <p:txBody>
+            <a:bodyPr rtlCol="0" anchor="b"/>
+            <a:lstStyle/>
+            <a:p>
+              <a:pPr algn="ctr"/>
+              <a:endParaRPr lang="en-US" sz="1400" dirty="0"/>
+            </a:p>
+          </p:txBody>
+        </p:sp>
+        <p:sp>
+          <p:nvSpPr>
+            <p:cNvPr id="54" name="Isosceles Triangle 53"/>
+            <p:cNvSpPr/>
+            <p:nvPr/>
+          </p:nvSpPr>
+          <p:spPr>
+            <a:xfrm flipV="1">
+              <a:off x="3920705" y="5375741"/>
+              <a:ext cx="1096403" cy="914300"/>
+            </a:xfrm>
+            <a:prstGeom prst="triangle">
+              <a:avLst/>
+            </a:prstGeom>
+            <a:solidFill>
+              <a:schemeClr val="accent6">
+                <a:lumMod val="20000"/>
+                <a:lumOff val="80000"/>
+              </a:schemeClr>
+            </a:solidFill>
+            <a:ln>
+              <a:noFill/>
+            </a:ln>
+            <a:effectLst/>
+            <a:scene3d>
+              <a:camera prst="orthographicFront">
+                <a:rot lat="0" lon="0" rev="0"/>
+              </a:camera>
+              <a:lightRig rig="threePt" dir="t">
+                <a:rot lat="0" lon="0" rev="1200000"/>
+              </a:lightRig>
+            </a:scene3d>
+            <a:sp3d/>
+          </p:spPr>
+          <p:style>
+            <a:lnRef idx="0">
+              <a:schemeClr val="accent1"/>
+            </a:lnRef>
+            <a:fillRef idx="3">
+              <a:schemeClr val="accent1"/>
+            </a:fillRef>
+            <a:effectRef idx="3">
+              <a:schemeClr val="accent1"/>
+            </a:effectRef>
+            <a:fontRef idx="minor">
+              <a:schemeClr val="lt1"/>
+            </a:fontRef>
+          </p:style>
+          <p:txBody>
+            <a:bodyPr rtlCol="0" anchor="b"/>
+            <a:lstStyle/>
+            <a:p>
+              <a:pPr algn="ctr"/>
+              <a:endParaRPr lang="en-US" sz="1400" dirty="0"/>
+            </a:p>
+          </p:txBody>
+        </p:sp>
+        <p:sp>
+          <p:nvSpPr>
+            <p:cNvPr id="55" name="Isosceles Triangle 54"/>
+            <p:cNvSpPr/>
+            <p:nvPr/>
+          </p:nvSpPr>
+          <p:spPr>
+            <a:xfrm>
+              <a:off x="4468908" y="5375541"/>
+              <a:ext cx="1096403" cy="914300"/>
+            </a:xfrm>
+            <a:prstGeom prst="triangle">
+              <a:avLst/>
+            </a:prstGeom>
+            <a:solidFill>
+              <a:schemeClr val="accent3"/>
+            </a:solidFill>
+            <a:ln>
+              <a:solidFill>
+                <a:schemeClr val="accent3">
+                  <a:lumMod val="50000"/>
+                </a:schemeClr>
+              </a:solidFill>
+            </a:ln>
+            <a:effectLst/>
           </p:spPr>
           <p:style>
             <a:lnRef idx="0">
@@ -4650,330 +5703,6 @@
           </p:txBody>
         </p:sp>
       </p:grpSp>
-      <p:sp>
-        <p:nvSpPr>
-          <p:cNvPr id="48" name="Isosceles Triangle 47"/>
-          <p:cNvSpPr/>
-          <p:nvPr/>
-        </p:nvSpPr>
-        <p:spPr>
-          <a:xfrm>
-            <a:off x="507575" y="5375541"/>
-            <a:ext cx="1096403" cy="914300"/>
-          </a:xfrm>
-          <a:prstGeom prst="triangle">
-            <a:avLst/>
-          </a:prstGeom>
-          <a:solidFill>
-            <a:schemeClr val="accent1">
-              <a:lumMod val="20000"/>
-              <a:lumOff val="80000"/>
-            </a:schemeClr>
-          </a:solidFill>
-          <a:effectLst/>
-          <a:scene3d>
-            <a:camera prst="orthographicFront">
-              <a:rot lat="0" lon="0" rev="0"/>
-            </a:camera>
-            <a:lightRig rig="threePt" dir="t">
-              <a:rot lat="0" lon="0" rev="1200000"/>
-            </a:lightRig>
-          </a:scene3d>
-          <a:sp3d/>
-        </p:spPr>
-        <p:style>
-          <a:lnRef idx="0">
-            <a:schemeClr val="accent1"/>
-          </a:lnRef>
-          <a:fillRef idx="3">
-            <a:schemeClr val="accent1"/>
-          </a:fillRef>
-          <a:effectRef idx="3">
-            <a:schemeClr val="accent1"/>
-          </a:effectRef>
-          <a:fontRef idx="minor">
-            <a:schemeClr val="lt1"/>
-          </a:fontRef>
-        </p:style>
-        <p:txBody>
-          <a:bodyPr rtlCol="0" anchor="b"/>
-          <a:lstStyle/>
-          <a:p>
-            <a:pPr algn="ctr"/>
-            <a:endParaRPr lang="en-US" sz="1400" dirty="0"/>
-          </a:p>
-        </p:txBody>
-      </p:sp>
-      <p:sp>
-        <p:nvSpPr>
-          <p:cNvPr id="49" name="Isosceles Triangle 48"/>
-          <p:cNvSpPr/>
-          <p:nvPr/>
-        </p:nvSpPr>
-        <p:spPr>
-          <a:xfrm flipV="1">
-            <a:off x="1055775" y="5375741"/>
-            <a:ext cx="1096403" cy="914300"/>
-          </a:xfrm>
-          <a:prstGeom prst="triangle">
-            <a:avLst/>
-          </a:prstGeom>
-          <a:solidFill>
-            <a:schemeClr val="accent6"/>
-          </a:solidFill>
-          <a:ln>
-            <a:solidFill>
-              <a:schemeClr val="accent6">
-                <a:lumMod val="50000"/>
-              </a:schemeClr>
-            </a:solidFill>
-          </a:ln>
-          <a:effectLst/>
-        </p:spPr>
-        <p:style>
-          <a:lnRef idx="0">
-            <a:schemeClr val="accent1"/>
-          </a:lnRef>
-          <a:fillRef idx="3">
-            <a:schemeClr val="accent1"/>
-          </a:fillRef>
-          <a:effectRef idx="3">
-            <a:schemeClr val="accent1"/>
-          </a:effectRef>
-          <a:fontRef idx="minor">
-            <a:schemeClr val="lt1"/>
-          </a:fontRef>
-        </p:style>
-        <p:txBody>
-          <a:bodyPr rtlCol="0" anchor="b"/>
-          <a:lstStyle/>
-          <a:p>
-            <a:pPr algn="ctr"/>
-            <a:endParaRPr lang="en-US" sz="1400" dirty="0"/>
-          </a:p>
-        </p:txBody>
-      </p:sp>
-      <p:sp>
-        <p:nvSpPr>
-          <p:cNvPr id="51" name="Isosceles Triangle 50"/>
-          <p:cNvSpPr/>
-          <p:nvPr/>
-        </p:nvSpPr>
-        <p:spPr>
-          <a:xfrm>
-            <a:off x="3920706" y="4461241"/>
-            <a:ext cx="1096403" cy="914300"/>
-          </a:xfrm>
-          <a:prstGeom prst="triangle">
-            <a:avLst/>
-          </a:prstGeom>
-          <a:solidFill>
-            <a:schemeClr val="accent4">
-              <a:lumMod val="20000"/>
-              <a:lumOff val="80000"/>
-            </a:schemeClr>
-          </a:solidFill>
-          <a:effectLst/>
-          <a:scene3d>
-            <a:camera prst="orthographicFront">
-              <a:rot lat="0" lon="0" rev="0"/>
-            </a:camera>
-            <a:lightRig rig="threePt" dir="t">
-              <a:rot lat="0" lon="0" rev="1200000"/>
-            </a:lightRig>
-          </a:scene3d>
-          <a:sp3d/>
-        </p:spPr>
-        <p:style>
-          <a:lnRef idx="0">
-            <a:schemeClr val="accent1"/>
-          </a:lnRef>
-          <a:fillRef idx="3">
-            <a:schemeClr val="accent1"/>
-          </a:fillRef>
-          <a:effectRef idx="3">
-            <a:schemeClr val="accent1"/>
-          </a:effectRef>
-          <a:fontRef idx="minor">
-            <a:schemeClr val="lt1"/>
-          </a:fontRef>
-        </p:style>
-        <p:txBody>
-          <a:bodyPr rtlCol="0" anchor="b"/>
-          <a:lstStyle/>
-          <a:p>
-            <a:pPr algn="ctr"/>
-            <a:endParaRPr lang="en-US" sz="1400" dirty="0"/>
-          </a:p>
-        </p:txBody>
-      </p:sp>
-      <p:sp>
-        <p:nvSpPr>
-          <p:cNvPr id="53" name="Isosceles Triangle 52"/>
-          <p:cNvSpPr/>
-          <p:nvPr/>
-        </p:nvSpPr>
-        <p:spPr>
-          <a:xfrm>
-            <a:off x="3372505" y="5375541"/>
-            <a:ext cx="1096403" cy="914300"/>
-          </a:xfrm>
-          <a:prstGeom prst="triangle">
-            <a:avLst/>
-          </a:prstGeom>
-          <a:solidFill>
-            <a:schemeClr val="accent1">
-              <a:lumMod val="20000"/>
-              <a:lumOff val="80000"/>
-            </a:schemeClr>
-          </a:solidFill>
-          <a:effectLst/>
-          <a:scene3d>
-            <a:camera prst="orthographicFront">
-              <a:rot lat="0" lon="0" rev="0"/>
-            </a:camera>
-            <a:lightRig rig="threePt" dir="t">
-              <a:rot lat="0" lon="0" rev="1200000"/>
-            </a:lightRig>
-          </a:scene3d>
-          <a:sp3d/>
-        </p:spPr>
-        <p:style>
-          <a:lnRef idx="0">
-            <a:schemeClr val="accent1"/>
-          </a:lnRef>
-          <a:fillRef idx="3">
-            <a:schemeClr val="accent1"/>
-          </a:fillRef>
-          <a:effectRef idx="3">
-            <a:schemeClr val="accent1"/>
-          </a:effectRef>
-          <a:fontRef idx="minor">
-            <a:schemeClr val="lt1"/>
-          </a:fontRef>
-        </p:style>
-        <p:txBody>
-          <a:bodyPr rtlCol="0" anchor="b"/>
-          <a:lstStyle/>
-          <a:p>
-            <a:pPr algn="ctr"/>
-            <a:endParaRPr lang="en-US" sz="1400" dirty="0"/>
-          </a:p>
-        </p:txBody>
-      </p:sp>
-      <p:sp>
-        <p:nvSpPr>
-          <p:cNvPr id="54" name="Isosceles Triangle 53"/>
-          <p:cNvSpPr/>
-          <p:nvPr/>
-        </p:nvSpPr>
-        <p:spPr>
-          <a:xfrm flipV="1">
-            <a:off x="3920705" y="5375741"/>
-            <a:ext cx="1096403" cy="914300"/>
-          </a:xfrm>
-          <a:prstGeom prst="triangle">
-            <a:avLst/>
-          </a:prstGeom>
-          <a:solidFill>
-            <a:schemeClr val="accent6">
-              <a:lumMod val="20000"/>
-              <a:lumOff val="80000"/>
-            </a:schemeClr>
-          </a:solidFill>
-          <a:ln>
-            <a:noFill/>
-          </a:ln>
-          <a:effectLst/>
-          <a:scene3d>
-            <a:camera prst="orthographicFront">
-              <a:rot lat="0" lon="0" rev="0"/>
-            </a:camera>
-            <a:lightRig rig="threePt" dir="t">
-              <a:rot lat="0" lon="0" rev="1200000"/>
-            </a:lightRig>
-          </a:scene3d>
-          <a:sp3d/>
-        </p:spPr>
-        <p:style>
-          <a:lnRef idx="0">
-            <a:schemeClr val="accent1"/>
-          </a:lnRef>
-          <a:fillRef idx="3">
-            <a:schemeClr val="accent1"/>
-          </a:fillRef>
-          <a:effectRef idx="3">
-            <a:schemeClr val="accent1"/>
-          </a:effectRef>
-          <a:fontRef idx="minor">
-            <a:schemeClr val="lt1"/>
-          </a:fontRef>
-        </p:style>
-        <p:txBody>
-          <a:bodyPr rtlCol="0" anchor="b"/>
-          <a:lstStyle/>
-          <a:p>
-            <a:pPr algn="ctr"/>
-            <a:endParaRPr lang="en-US" sz="1400" dirty="0"/>
-          </a:p>
-        </p:txBody>
-      </p:sp>
-      <p:sp>
-        <p:nvSpPr>
-          <p:cNvPr id="55" name="Isosceles Triangle 54"/>
-          <p:cNvSpPr/>
-          <p:nvPr/>
-        </p:nvSpPr>
-        <p:spPr>
-          <a:xfrm>
-            <a:off x="4468908" y="5375541"/>
-            <a:ext cx="1096403" cy="914300"/>
-          </a:xfrm>
-          <a:prstGeom prst="triangle">
-            <a:avLst/>
-          </a:prstGeom>
-          <a:solidFill>
-            <a:schemeClr val="accent3"/>
-          </a:solidFill>
-          <a:ln>
-            <a:solidFill>
-              <a:schemeClr val="accent3">
-                <a:lumMod val="50000"/>
-              </a:schemeClr>
-            </a:solidFill>
-          </a:ln>
-          <a:effectLst/>
-        </p:spPr>
-        <p:style>
-          <a:lnRef idx="0">
-            <a:schemeClr val="accent3"/>
-          </a:lnRef>
-          <a:fillRef idx="3">
-            <a:schemeClr val="accent3"/>
-          </a:fillRef>
-          <a:effectRef idx="3">
-            <a:schemeClr val="accent3"/>
-          </a:effectRef>
-          <a:fontRef idx="minor">
-            <a:schemeClr val="lt1"/>
-          </a:fontRef>
-        </p:style>
-        <p:txBody>
-          <a:bodyPr rtlCol="0" anchor="b"/>
-          <a:lstStyle/>
-          <a:p>
-            <a:pPr algn="ctr"/>
-            <a:endParaRPr lang="en-US" sz="1400" dirty="0">
-              <a:solidFill>
-                <a:schemeClr val="accent3">
-                  <a:lumMod val="40000"/>
-                  <a:lumOff val="60000"/>
-                </a:schemeClr>
-              </a:solidFill>
-            </a:endParaRPr>
-          </a:p>
-        </p:txBody>
-      </p:sp>
     </p:spTree>
     <p:extLst>
       <p:ext uri="{BB962C8B-B14F-4D97-AF65-F5344CB8AC3E}">
@@ -4994,7 +5723,81 @@
 </p:sld>
 </file>
 
-<file path=ppt/slides/slide3.xml><?xml version="1.0" encoding="utf-8"?>
+<file path=ppt/slides/slide7.xml><?xml version="1.0" encoding="utf-8"?>
+<p:sld xmlns:a="http://schemas.openxmlformats.org/drawingml/2006/main" xmlns:r="http://schemas.openxmlformats.org/officeDocument/2006/relationships" xmlns:p="http://schemas.openxmlformats.org/presentationml/2006/main">
+  <p:cSld>
+    <p:spTree>
+      <p:nvGrpSpPr>
+        <p:cNvPr id="1" name=""/>
+        <p:cNvGrpSpPr/>
+        <p:nvPr/>
+      </p:nvGrpSpPr>
+      <p:grpSpPr>
+        <a:xfrm>
+          <a:off x="0" y="0"/>
+          <a:ext cx="0" cy="0"/>
+          <a:chOff x="0" y="0"/>
+          <a:chExt cx="0" cy="0"/>
+        </a:xfrm>
+      </p:grpSpPr>
+      <p:sp>
+        <p:nvSpPr>
+          <p:cNvPr id="2" name="Title 1"/>
+          <p:cNvSpPr>
+            <a:spLocks noGrp="1"/>
+          </p:cNvSpPr>
+          <p:nvPr>
+            <p:ph type="title"/>
+          </p:nvPr>
+        </p:nvSpPr>
+        <p:spPr/>
+        <p:txBody>
+          <a:bodyPr>
+            <a:normAutofit/>
+          </a:bodyPr>
+          <a:lstStyle/>
+          <a:p>
+            <a:r>
+              <a:rPr lang="en-US" dirty="0" smtClean="0"/>
+              <a:t>Previous Versions</a:t>
+            </a:r>
+            <a:endParaRPr lang="en-US" dirty="0"/>
+          </a:p>
+        </p:txBody>
+      </p:sp>
+      <p:sp>
+        <p:nvSpPr>
+          <p:cNvPr id="3" name="Content Placeholder 2"/>
+          <p:cNvSpPr>
+            <a:spLocks noGrp="1"/>
+          </p:cNvSpPr>
+          <p:nvPr>
+            <p:ph idx="1"/>
+          </p:nvPr>
+        </p:nvSpPr>
+        <p:spPr/>
+        <p:txBody>
+          <a:bodyPr/>
+          <a:lstStyle/>
+          <a:p>
+            <a:endParaRPr lang="en-US"/>
+          </a:p>
+        </p:txBody>
+      </p:sp>
+    </p:spTree>
+    <p:extLst>
+      <p:ext uri="{BB962C8B-B14F-4D97-AF65-F5344CB8AC3E}">
+        <p14:creationId xmlns:p14="http://schemas.microsoft.com/office/powerpoint/2010/main" val="2002256207"/>
+      </p:ext>
+    </p:extLst>
+  </p:cSld>
+  <p:clrMapOvr>
+    <a:masterClrMapping/>
+  </p:clrMapOvr>
+</p:sld>
+</file>
+
+<file path=ppt/slides/slide8.xml><?xml version="1.0" encoding="utf-8"?>
 <p:sld xmlns:a="http://schemas.openxmlformats.org/drawingml/2006/main" xmlns:r="http://schemas.openxmlformats.org/officeDocument/2006/relationships" xmlns:p="http://schemas.openxmlformats.org/presentationml/2006/main">
   <p:cSld>
     <p:spTree>
@@ -5664,7 +6467,7 @@
 </p:sld>
 </file>
 
-<file path=ppt/slides/slide4.xml><?xml version="1.0" encoding="utf-8"?>
+<file path=ppt/slides/slide9.xml><?xml version="1.0" encoding="utf-8"?>
 <p:sld xmlns:a="http://schemas.openxmlformats.org/drawingml/2006/main" xmlns:r="http://schemas.openxmlformats.org/officeDocument/2006/relationships" xmlns:p="http://schemas.openxmlformats.org/presentationml/2006/main">
   <p:cSld>
     <p:spTree>

</xml_diff>